<commit_message>
Documentation change updated diagram
</commit_message>
<xml_diff>
--- a/Documentation/Images/Sequencer State Diagrams.pptx
+++ b/Documentation/Images/Sequencer State Diagrams.pptx
@@ -104,6 +104,11 @@
       </a:defRPr>
     </a:lvl9pPr>
   </p:defaultTextStyle>
+  <p:extLst>
+    <p:ext uri="{EFAFB233-063F-42B5-8137-9DF3F51BA10A}">
+      <p15:sldGuideLst xmlns:p15="http://schemas.microsoft.com/office/powerpoint/2012/main"/>
+    </p:ext>
+  </p:extLst>
 </p:presentation>
 </file>
 
@@ -3794,19 +3799,19 @@
           <p:cNvCxnSpPr>
             <a:cxnSpLocks/>
             <a:stCxn id="12" idx="2"/>
-            <a:endCxn id="5" idx="1"/>
           </p:cNvCxnSpPr>
           <p:nvPr/>
         </p:nvCxnSpPr>
         <p:spPr>
           <a:xfrm rot="5400000" flipH="1">
-            <a:off x="3612585" y="3274896"/>
-            <a:ext cx="4411998" cy="554832"/>
+            <a:off x="4029707" y="3692018"/>
+            <a:ext cx="3606666" cy="525920"/>
           </a:xfrm>
-          <a:prstGeom prst="bentConnector4">
+          <a:prstGeom prst="bentConnector5">
             <a:avLst>
-              <a:gd name="adj1" fmla="val -5181"/>
-              <a:gd name="adj2" fmla="val 574688"/>
+              <a:gd name="adj1" fmla="val -6338"/>
+              <a:gd name="adj2" fmla="val 613062"/>
+              <a:gd name="adj3" fmla="val 99716"/>
             </a:avLst>
           </a:prstGeom>
           <a:ln w="60325">

</xml_diff>